<commit_message>
CPR increase and 32bit angle
</commit_message>
<xml_diff>
--- a/brWheel_my/bts7960_wiring_diagram.pptx
+++ b/brWheel_my/bts7960_wiring_diagram.pptx
@@ -241,7 +241,7 @@
           <a:p>
             <a:fld id="{A398FB1A-F8C3-427F-BE44-B87966AC4D7F}" type="datetimeFigureOut">
               <a:rPr lang="en-US" smtClean="0"/>
-              <a:t>07-Jun-22</a:t>
+              <a:t>23-Jun-22</a:t>
             </a:fld>
             <a:endParaRPr lang="en-US"/>
           </a:p>
@@ -409,7 +409,7 @@
           <a:p>
             <a:fld id="{A398FB1A-F8C3-427F-BE44-B87966AC4D7F}" type="datetimeFigureOut">
               <a:rPr lang="en-US" smtClean="0"/>
-              <a:t>07-Jun-22</a:t>
+              <a:t>23-Jun-22</a:t>
             </a:fld>
             <a:endParaRPr lang="en-US"/>
           </a:p>
@@ -587,7 +587,7 @@
           <a:p>
             <a:fld id="{A398FB1A-F8C3-427F-BE44-B87966AC4D7F}" type="datetimeFigureOut">
               <a:rPr lang="en-US" smtClean="0"/>
-              <a:t>07-Jun-22</a:t>
+              <a:t>23-Jun-22</a:t>
             </a:fld>
             <a:endParaRPr lang="en-US"/>
           </a:p>
@@ -755,7 +755,7 @@
           <a:p>
             <a:fld id="{A398FB1A-F8C3-427F-BE44-B87966AC4D7F}" type="datetimeFigureOut">
               <a:rPr lang="en-US" smtClean="0"/>
-              <a:t>07-Jun-22</a:t>
+              <a:t>23-Jun-22</a:t>
             </a:fld>
             <a:endParaRPr lang="en-US"/>
           </a:p>
@@ -1000,7 +1000,7 @@
           <a:p>
             <a:fld id="{A398FB1A-F8C3-427F-BE44-B87966AC4D7F}" type="datetimeFigureOut">
               <a:rPr lang="en-US" smtClean="0"/>
-              <a:t>07-Jun-22</a:t>
+              <a:t>23-Jun-22</a:t>
             </a:fld>
             <a:endParaRPr lang="en-US"/>
           </a:p>
@@ -1229,7 +1229,7 @@
           <a:p>
             <a:fld id="{A398FB1A-F8C3-427F-BE44-B87966AC4D7F}" type="datetimeFigureOut">
               <a:rPr lang="en-US" smtClean="0"/>
-              <a:t>07-Jun-22</a:t>
+              <a:t>23-Jun-22</a:t>
             </a:fld>
             <a:endParaRPr lang="en-US"/>
           </a:p>
@@ -1593,7 +1593,7 @@
           <a:p>
             <a:fld id="{A398FB1A-F8C3-427F-BE44-B87966AC4D7F}" type="datetimeFigureOut">
               <a:rPr lang="en-US" smtClean="0"/>
-              <a:t>07-Jun-22</a:t>
+              <a:t>23-Jun-22</a:t>
             </a:fld>
             <a:endParaRPr lang="en-US"/>
           </a:p>
@@ -1710,7 +1710,7 @@
           <a:p>
             <a:fld id="{A398FB1A-F8C3-427F-BE44-B87966AC4D7F}" type="datetimeFigureOut">
               <a:rPr lang="en-US" smtClean="0"/>
-              <a:t>07-Jun-22</a:t>
+              <a:t>23-Jun-22</a:t>
             </a:fld>
             <a:endParaRPr lang="en-US"/>
           </a:p>
@@ -1805,7 +1805,7 @@
           <a:p>
             <a:fld id="{A398FB1A-F8C3-427F-BE44-B87966AC4D7F}" type="datetimeFigureOut">
               <a:rPr lang="en-US" smtClean="0"/>
-              <a:t>07-Jun-22</a:t>
+              <a:t>23-Jun-22</a:t>
             </a:fld>
             <a:endParaRPr lang="en-US"/>
           </a:p>
@@ -2080,7 +2080,7 @@
           <a:p>
             <a:fld id="{A398FB1A-F8C3-427F-BE44-B87966AC4D7F}" type="datetimeFigureOut">
               <a:rPr lang="en-US" smtClean="0"/>
-              <a:t>07-Jun-22</a:t>
+              <a:t>23-Jun-22</a:t>
             </a:fld>
             <a:endParaRPr lang="en-US"/>
           </a:p>
@@ -2332,7 +2332,7 @@
           <a:p>
             <a:fld id="{A398FB1A-F8C3-427F-BE44-B87966AC4D7F}" type="datetimeFigureOut">
               <a:rPr lang="en-US" smtClean="0"/>
-              <a:t>07-Jun-22</a:t>
+              <a:t>23-Jun-22</a:t>
             </a:fld>
             <a:endParaRPr lang="en-US"/>
           </a:p>
@@ -2543,7 +2543,7 @@
           <a:p>
             <a:fld id="{A398FB1A-F8C3-427F-BE44-B87966AC4D7F}" type="datetimeFigureOut">
               <a:rPr lang="en-US" smtClean="0"/>
-              <a:t>07-Jun-22</a:t>
+              <a:t>23-Jun-22</a:t>
             </a:fld>
             <a:endParaRPr lang="en-US"/>
           </a:p>
@@ -3188,11 +3188,15 @@
             </a:r>
             <a:r>
               <a:rPr lang="en-US" dirty="0" smtClean="0"/>
-              <a:t>H-bridge motor driver </a:t>
+              <a:t>H-bridge motor driver (valid for all firmware in PWM± mode, except </a:t>
             </a:r>
             <a:r>
               <a:rPr lang="en-US" dirty="0" smtClean="0"/>
-              <a:t>(valid for all firmware in PWM± mode, except fw-v183)</a:t>
+              <a:t>fw-vXX3</a:t>
+            </a:r>
+            <a:r>
+              <a:rPr lang="en-US" dirty="0" smtClean="0"/>
+              <a:t>)</a:t>
             </a:r>
             <a:endParaRPr lang="en-US" dirty="0"/>
           </a:p>
@@ -3273,21 +3277,13 @@
           <a:p>
             <a:r>
               <a:rPr lang="en-US" sz="1400" i="1" dirty="0" smtClean="0"/>
-              <a:t>BTS7960 or any other 2 channel </a:t>
-            </a:r>
+              <a:t>BTS7960 or any other 2 channel H-bridge</a:t>
+            </a:r>
+          </a:p>
+          <a:p>
             <a:r>
               <a:rPr lang="en-US" sz="1400" i="1" dirty="0" smtClean="0"/>
-              <a:t>H-bridge</a:t>
-            </a:r>
-          </a:p>
-          <a:p>
-            <a:r>
-              <a:rPr lang="en-US" sz="1400" i="1" dirty="0" smtClean="0"/>
-              <a:t>motor driver with </a:t>
-            </a:r>
-            <a:r>
-              <a:rPr lang="en-US" sz="1400" i="1" dirty="0" smtClean="0"/>
-              <a:t>PWM inputs</a:t>
+              <a:t>motor driver with PWM inputs</a:t>
             </a:r>
             <a:endParaRPr lang="en-US" sz="1400" i="1" dirty="0"/>
           </a:p>
@@ -3722,31 +3718,23 @@
           <a:p>
             <a:r>
               <a:rPr lang="en-US" sz="1400" i="1" dirty="0" smtClean="0"/>
-              <a:t>signal input, </a:t>
-            </a:r>
+              <a:t>signal input, then you may</a:t>
+            </a:r>
+          </a:p>
+          <a:p>
             <a:r>
               <a:rPr lang="en-US" sz="1400" i="1" dirty="0" smtClean="0"/>
-              <a:t>then you may</a:t>
+              <a:t>try the wiring trick by shorting</a:t>
             </a:r>
           </a:p>
           <a:p>
             <a:r>
               <a:rPr lang="en-US" sz="1400" i="1" dirty="0" smtClean="0"/>
-              <a:t>try the wiring trick by </a:t>
+              <a:t>BTS </a:t>
             </a:r>
             <a:r>
               <a:rPr lang="en-US" sz="1400" i="1" dirty="0" smtClean="0"/>
-              <a:t>shorting</a:t>
-            </a:r>
-          </a:p>
-          <a:p>
-            <a:r>
-              <a:rPr lang="en-US" sz="1400" i="1" dirty="0" err="1" smtClean="0"/>
-              <a:t>bts</a:t>
-            </a:r>
-            <a:r>
-              <a:rPr lang="en-US" sz="1400" i="1" dirty="0" smtClean="0"/>
-              <a:t> pins </a:t>
+              <a:t>pins </a:t>
             </a:r>
             <a:r>
               <a:rPr lang="en-US" sz="1400" dirty="0" smtClean="0"/>

</xml_diff>